<commit_message>
minor changes in the intro
</commit_message>
<xml_diff>
--- a/1-clean-code-intro.pptx
+++ b/1-clean-code-intro.pptx
@@ -220,7 +220,7 @@
             <a:fld id="{9C7200FD-C438-496B-A78D-3816F97A74F0}" type="datetimeFigureOut">
               <a:rPr lang="el-GR" smtClean="0"/>
               <a:pPr/>
-              <a:t>1/9/2022</a:t>
+              <a:t>1/10/2023</a:t>
             </a:fld>
             <a:endParaRPr lang="en-US"/>
           </a:p>
@@ -382,7 +382,7 @@
             <a:fld id="{2313A616-81EC-4D71-A13E-8040CCC87A8F}" type="datetimeFigureOut">
               <a:rPr lang="el-GR" smtClean="0"/>
               <a:pPr/>
-              <a:t>1/9/2022</a:t>
+              <a:t>1/10/2023</a:t>
             </a:fld>
             <a:endParaRPr lang="el-GR"/>
           </a:p>
@@ -1515,7 +1515,7 @@
             <a:fld id="{1D8BD707-D9CF-40AE-B4C6-C98DA3205C09}" type="datetimeFigureOut">
               <a:rPr lang="en-US" smtClean="0"/>
               <a:pPr/>
-              <a:t>9/1/2022</a:t>
+              <a:t>10/1/2023</a:t>
             </a:fld>
             <a:endParaRPr lang="en-US"/>
           </a:p>
@@ -1876,7 +1876,7 @@
             <a:fld id="{1D8BD707-D9CF-40AE-B4C6-C98DA3205C09}" type="datetimeFigureOut">
               <a:rPr lang="en-US" smtClean="0"/>
               <a:pPr/>
-              <a:t>9/1/2022</a:t>
+              <a:t>10/1/2023</a:t>
             </a:fld>
             <a:endParaRPr lang="en-US"/>
           </a:p>
@@ -2053,7 +2053,7 @@
             <a:fld id="{1D8BD707-D9CF-40AE-B4C6-C98DA3205C09}" type="datetimeFigureOut">
               <a:rPr lang="en-US" smtClean="0"/>
               <a:pPr/>
-              <a:t>9/1/2022</a:t>
+              <a:t>10/1/2023</a:t>
             </a:fld>
             <a:endParaRPr lang="en-US"/>
           </a:p>
@@ -2290,7 +2290,7 @@
             <a:fld id="{1D8BD707-D9CF-40AE-B4C6-C98DA3205C09}" type="datetimeFigureOut">
               <a:rPr lang="en-US" smtClean="0"/>
               <a:pPr/>
-              <a:t>9/1/2022</a:t>
+              <a:t>10/1/2023</a:t>
             </a:fld>
             <a:endParaRPr lang="en-US"/>
           </a:p>
@@ -2561,7 +2561,7 @@
             <a:fld id="{1D8BD707-D9CF-40AE-B4C6-C98DA3205C09}" type="datetimeFigureOut">
               <a:rPr lang="en-US" smtClean="0"/>
               <a:pPr/>
-              <a:t>9/1/2022</a:t>
+              <a:t>10/1/2023</a:t>
             </a:fld>
             <a:endParaRPr lang="en-US"/>
           </a:p>
@@ -2783,7 +2783,7 @@
             <a:fld id="{1D8BD707-D9CF-40AE-B4C6-C98DA3205C09}" type="datetimeFigureOut">
               <a:rPr lang="en-US" smtClean="0"/>
               <a:pPr/>
-              <a:t>9/1/2022</a:t>
+              <a:t>10/1/2023</a:t>
             </a:fld>
             <a:endParaRPr lang="en-US"/>
           </a:p>
@@ -3137,7 +3137,7 @@
             <a:fld id="{1D8BD707-D9CF-40AE-B4C6-C98DA3205C09}" type="datetimeFigureOut">
               <a:rPr lang="en-US" smtClean="0"/>
               <a:pPr/>
-              <a:t>9/1/2022</a:t>
+              <a:t>10/1/2023</a:t>
             </a:fld>
             <a:endParaRPr lang="en-US"/>
           </a:p>
@@ -3371,7 +3371,7 @@
             <a:fld id="{1D8BD707-D9CF-40AE-B4C6-C98DA3205C09}" type="datetimeFigureOut">
               <a:rPr lang="en-US" smtClean="0"/>
               <a:pPr/>
-              <a:t>9/1/2022</a:t>
+              <a:t>10/1/2023</a:t>
             </a:fld>
             <a:endParaRPr lang="en-US"/>
           </a:p>
@@ -3513,7 +3513,7 @@
             <a:fld id="{1D8BD707-D9CF-40AE-B4C6-C98DA3205C09}" type="datetimeFigureOut">
               <a:rPr lang="en-US" smtClean="0"/>
               <a:pPr/>
-              <a:t>9/1/2022</a:t>
+              <a:t>10/1/2023</a:t>
             </a:fld>
             <a:endParaRPr lang="en-US"/>
           </a:p>
@@ -3792,7 +3792,7 @@
             <a:fld id="{1D8BD707-D9CF-40AE-B4C6-C98DA3205C09}" type="datetimeFigureOut">
               <a:rPr lang="en-US" smtClean="0"/>
               <a:pPr/>
-              <a:t>9/1/2022</a:t>
+              <a:t>10/1/2023</a:t>
             </a:fld>
             <a:endParaRPr lang="en-US"/>
           </a:p>
@@ -4201,7 +4201,7 @@
             <a:fld id="{1D8BD707-D9CF-40AE-B4C6-C98DA3205C09}" type="datetimeFigureOut">
               <a:rPr lang="en-US" smtClean="0"/>
               <a:pPr/>
-              <a:t>9/1/2022</a:t>
+              <a:t>10/1/2023</a:t>
             </a:fld>
             <a:endParaRPr lang="en-US"/>
           </a:p>
@@ -4541,7 +4541,7 @@
             <a:fld id="{1D8BD707-D9CF-40AE-B4C6-C98DA3205C09}" type="datetimeFigureOut">
               <a:rPr lang="en-US" smtClean="0"/>
               <a:pPr/>
-              <a:t>9/1/2022</a:t>
+              <a:t>10/1/2023</a:t>
             </a:fld>
             <a:endParaRPr lang="en-US"/>
           </a:p>
@@ -5983,7 +5983,7 @@
         <p:spPr>
           <a:xfrm>
             <a:off x="381000" y="2362200"/>
-            <a:ext cx="8534400" cy="2215991"/>
+            <a:ext cx="8534400" cy="2092881"/>
           </a:xfrm>
           <a:prstGeom prst="rect">
             <a:avLst/>
@@ -6023,11 +6023,11 @@
           </a:p>
           <a:p>
             <a:r>
-              <a:rPr lang="en-US" sz="2400" dirty="0" smtClean="0"/>
+              <a:rPr lang="en-US" sz="2000" dirty="0" smtClean="0"/>
               <a:t>Spending time </a:t>
             </a:r>
             <a:r>
-              <a:rPr lang="en-US" sz="2400" dirty="0" smtClean="0">
+              <a:rPr lang="en-US" sz="2000" dirty="0" smtClean="0">
                 <a:solidFill>
                   <a:srgbClr val="FF0000"/>
                 </a:solidFill>
@@ -6035,11 +6035,11 @@
               <a:t>keeping your code</a:t>
             </a:r>
             <a:r>
-              <a:rPr lang="en-US" sz="2400" dirty="0" smtClean="0"/>
+              <a:rPr lang="en-US" sz="2000" dirty="0" smtClean="0"/>
               <a:t> clean is not just </a:t>
             </a:r>
             <a:r>
-              <a:rPr lang="en-US" sz="2400" dirty="0" smtClean="0">
+              <a:rPr lang="en-US" sz="2000" dirty="0" smtClean="0">
                 <a:solidFill>
                   <a:srgbClr val="FF0000"/>
                 </a:solidFill>
@@ -6047,11 +6047,11 @@
               <a:t>cost effective</a:t>
             </a:r>
             <a:r>
-              <a:rPr lang="en-US" sz="2400" dirty="0" smtClean="0"/>
+              <a:rPr lang="en-US" sz="2000" dirty="0" smtClean="0"/>
               <a:t>; it’s a matter of </a:t>
             </a:r>
             <a:r>
-              <a:rPr lang="en-US" sz="2400" dirty="0" smtClean="0">
+              <a:rPr lang="en-US" sz="2000" dirty="0" smtClean="0">
                 <a:solidFill>
                   <a:srgbClr val="FF0000"/>
                 </a:solidFill>
@@ -9130,16 +9130,28 @@
               <a:rPr lang="en-US" dirty="0" smtClean="0">
                 <a:latin typeface="Gill Sans MT" pitchFamily="34" charset="0"/>
               </a:rPr>
-              <a:t>Part1: Review and analyze the problems of an existing software</a:t>
-            </a:r>
-          </a:p>
-          <a:p>
-            <a:pPr lvl="1"/>
+              <a:t>Review </a:t>
+            </a:r>
             <a:r>
               <a:rPr lang="en-US" dirty="0" smtClean="0">
                 <a:latin typeface="Gill Sans MT" pitchFamily="34" charset="0"/>
               </a:rPr>
-              <a:t>Part II: Refactoring and extension of the software</a:t>
+              <a:t>and analyze the problems of an existing software</a:t>
+            </a:r>
+          </a:p>
+          <a:p>
+            <a:pPr lvl="1"/>
+            <a:r>
+              <a:rPr lang="en-US" smtClean="0">
+                <a:latin typeface="Gill Sans MT" pitchFamily="34" charset="0"/>
+              </a:rPr>
+              <a:t>Refactoring </a:t>
+            </a:r>
+            <a:r>
+              <a:rPr lang="en-US" dirty="0" smtClean="0">
+                <a:latin typeface="Gill Sans MT" pitchFamily="34" charset="0"/>
+              </a:rPr>
+              <a:t>and extension of the software</a:t>
             </a:r>
           </a:p>
           <a:p>

</xml_diff>